<commit_message>
SHA1 -> 데이터타입 (CHAR(40)) / SHA2 (SHA256) -> 데이터타입 (CHAR(64))
</commit_message>
<xml_diff>
--- a/task_1/ppt.pptx
+++ b/task_1/ppt.pptx
@@ -5,7 +5,7 @@
     <p:sldMasterId id="2147483648" r:id="rId1"/>
   </p:sldMasterIdLst>
   <p:notesMasterIdLst>
-    <p:notesMasterId r:id="rId20"/>
+    <p:notesMasterId r:id="rId21"/>
   </p:notesMasterIdLst>
   <p:sldIdLst>
     <p:sldId id="260" r:id="rId2"/>
@@ -26,6 +26,7 @@
     <p:sldId id="287" r:id="rId17"/>
     <p:sldId id="288" r:id="rId18"/>
     <p:sldId id="277" r:id="rId19"/>
+    <p:sldId id="292" r:id="rId20"/>
   </p:sldIdLst>
   <p:sldSz cx="12192000" cy="6858000"/>
   <p:notesSz cx="6858000" cy="9144000"/>
@@ -214,7 +215,7 @@
           <a:p>
             <a:fld id="{FE98F0CA-61E8-411D-B615-E0E14D7AB476}" type="datetimeFigureOut">
               <a:rPr lang="ko-KR" altLang="en-US" smtClean="0"/>
-              <a:t>2019-07-02</a:t>
+              <a:t>2019-07-04</a:t>
             </a:fld>
             <a:endParaRPr lang="ko-KR" altLang="en-US"/>
           </a:p>
@@ -1237,6 +1238,90 @@
 </p:notes>
 </file>
 
+<file path=ppt/notesSlides/notesSlide18.xml><?xml version="1.0" encoding="utf-8"?>
+<p:notes xmlns:a="http://schemas.openxmlformats.org/drawingml/2006/main" xmlns:r="http://schemas.openxmlformats.org/officeDocument/2006/relationships" xmlns:p="http://schemas.openxmlformats.org/presentationml/2006/main">
+  <p:cSld>
+    <p:spTree>
+      <p:nvGrpSpPr>
+        <p:cNvPr id="1" name=""/>
+        <p:cNvGrpSpPr/>
+        <p:nvPr/>
+      </p:nvGrpSpPr>
+      <p:grpSpPr>
+        <a:xfrm>
+          <a:off x="0" y="0"/>
+          <a:ext cx="0" cy="0"/>
+          <a:chOff x="0" y="0"/>
+          <a:chExt cx="0" cy="0"/>
+        </a:xfrm>
+      </p:grpSpPr>
+      <p:sp>
+        <p:nvSpPr>
+          <p:cNvPr id="2" name="슬라이드 이미지 개체 틀 1"/>
+          <p:cNvSpPr>
+            <a:spLocks noGrp="1" noRot="1" noChangeAspect="1"/>
+          </p:cNvSpPr>
+          <p:nvPr>
+            <p:ph type="sldImg"/>
+          </p:nvPr>
+        </p:nvSpPr>
+        <p:spPr/>
+      </p:sp>
+      <p:sp>
+        <p:nvSpPr>
+          <p:cNvPr id="3" name="슬라이드 노트 개체 틀 2"/>
+          <p:cNvSpPr>
+            <a:spLocks noGrp="1"/>
+          </p:cNvSpPr>
+          <p:nvPr>
+            <p:ph type="body" idx="1"/>
+          </p:nvPr>
+        </p:nvSpPr>
+        <p:spPr/>
+        <p:txBody>
+          <a:bodyPr/>
+          <a:lstStyle/>
+          <a:p>
+            <a:endParaRPr lang="en-US" altLang="ko-KR" dirty="0"/>
+          </a:p>
+        </p:txBody>
+      </p:sp>
+      <p:sp>
+        <p:nvSpPr>
+          <p:cNvPr id="4" name="슬라이드 번호 개체 틀 3"/>
+          <p:cNvSpPr>
+            <a:spLocks noGrp="1"/>
+          </p:cNvSpPr>
+          <p:nvPr>
+            <p:ph type="sldNum" sz="quarter" idx="10"/>
+          </p:nvPr>
+        </p:nvSpPr>
+        <p:spPr/>
+        <p:txBody>
+          <a:bodyPr/>
+          <a:lstStyle/>
+          <a:p>
+            <a:fld id="{8F14057D-D575-4D6B-822C-35733C39311A}" type="slidenum">
+              <a:rPr lang="ko-KR" altLang="en-US" smtClean="0"/>
+              <a:t>19</a:t>
+            </a:fld>
+            <a:endParaRPr lang="ko-KR" altLang="en-US"/>
+          </a:p>
+        </p:txBody>
+      </p:sp>
+    </p:spTree>
+    <p:extLst>
+      <p:ext uri="{BB962C8B-B14F-4D97-AF65-F5344CB8AC3E}">
+        <p14:creationId xmlns:p14="http://schemas.microsoft.com/office/powerpoint/2010/main" val="511393407"/>
+      </p:ext>
+    </p:extLst>
+  </p:cSld>
+  <p:clrMapOvr>
+    <a:masterClrMapping/>
+  </p:clrMapOvr>
+</p:notes>
+</file>
+
 <file path=ppt/notesSlides/notesSlide2.xml><?xml version="1.0" encoding="utf-8"?>
 <p:notes xmlns:a="http://schemas.openxmlformats.org/drawingml/2006/main" xmlns:r="http://schemas.openxmlformats.org/officeDocument/2006/relationships" xmlns:p="http://schemas.openxmlformats.org/presentationml/2006/main">
   <p:cSld>
@@ -2056,7 +2141,7 @@
           <a:p>
             <a:fld id="{5B658BC9-C7E9-412A-B4B5-80B54CE2512A}" type="datetimeFigureOut">
               <a:rPr lang="ko-KR" altLang="en-US" smtClean="0"/>
-              <a:t>2019-07-02</a:t>
+              <a:t>2019-07-04</a:t>
             </a:fld>
             <a:endParaRPr lang="ko-KR" altLang="en-US"/>
           </a:p>
@@ -2254,7 +2339,7 @@
           <a:p>
             <a:fld id="{5B658BC9-C7E9-412A-B4B5-80B54CE2512A}" type="datetimeFigureOut">
               <a:rPr lang="ko-KR" altLang="en-US" smtClean="0"/>
-              <a:t>2019-07-02</a:t>
+              <a:t>2019-07-04</a:t>
             </a:fld>
             <a:endParaRPr lang="ko-KR" altLang="en-US"/>
           </a:p>
@@ -2462,7 +2547,7 @@
           <a:p>
             <a:fld id="{5B658BC9-C7E9-412A-B4B5-80B54CE2512A}" type="datetimeFigureOut">
               <a:rPr lang="ko-KR" altLang="en-US" smtClean="0"/>
-              <a:t>2019-07-02</a:t>
+              <a:t>2019-07-04</a:t>
             </a:fld>
             <a:endParaRPr lang="ko-KR" altLang="en-US"/>
           </a:p>
@@ -2660,7 +2745,7 @@
           <a:p>
             <a:fld id="{5B658BC9-C7E9-412A-B4B5-80B54CE2512A}" type="datetimeFigureOut">
               <a:rPr lang="ko-KR" altLang="en-US" smtClean="0"/>
-              <a:t>2019-07-02</a:t>
+              <a:t>2019-07-04</a:t>
             </a:fld>
             <a:endParaRPr lang="ko-KR" altLang="en-US"/>
           </a:p>
@@ -2935,7 +3020,7 @@
           <a:p>
             <a:fld id="{5B658BC9-C7E9-412A-B4B5-80B54CE2512A}" type="datetimeFigureOut">
               <a:rPr lang="ko-KR" altLang="en-US" smtClean="0"/>
-              <a:t>2019-07-02</a:t>
+              <a:t>2019-07-04</a:t>
             </a:fld>
             <a:endParaRPr lang="ko-KR" altLang="en-US"/>
           </a:p>
@@ -3200,7 +3285,7 @@
           <a:p>
             <a:fld id="{5B658BC9-C7E9-412A-B4B5-80B54CE2512A}" type="datetimeFigureOut">
               <a:rPr lang="ko-KR" altLang="en-US" smtClean="0"/>
-              <a:t>2019-07-02</a:t>
+              <a:t>2019-07-04</a:t>
             </a:fld>
             <a:endParaRPr lang="ko-KR" altLang="en-US"/>
           </a:p>
@@ -3612,7 +3697,7 @@
           <a:p>
             <a:fld id="{5B658BC9-C7E9-412A-B4B5-80B54CE2512A}" type="datetimeFigureOut">
               <a:rPr lang="ko-KR" altLang="en-US" smtClean="0"/>
-              <a:t>2019-07-02</a:t>
+              <a:t>2019-07-04</a:t>
             </a:fld>
             <a:endParaRPr lang="ko-KR" altLang="en-US"/>
           </a:p>
@@ -3753,7 +3838,7 @@
           <a:p>
             <a:fld id="{5B658BC9-C7E9-412A-B4B5-80B54CE2512A}" type="datetimeFigureOut">
               <a:rPr lang="ko-KR" altLang="en-US" smtClean="0"/>
-              <a:t>2019-07-02</a:t>
+              <a:t>2019-07-04</a:t>
             </a:fld>
             <a:endParaRPr lang="ko-KR" altLang="en-US"/>
           </a:p>
@@ -3866,7 +3951,7 @@
           <a:p>
             <a:fld id="{5B658BC9-C7E9-412A-B4B5-80B54CE2512A}" type="datetimeFigureOut">
               <a:rPr lang="ko-KR" altLang="en-US" smtClean="0"/>
-              <a:t>2019-07-02</a:t>
+              <a:t>2019-07-04</a:t>
             </a:fld>
             <a:endParaRPr lang="ko-KR" altLang="en-US"/>
           </a:p>
@@ -4177,7 +4262,7 @@
           <a:p>
             <a:fld id="{5B658BC9-C7E9-412A-B4B5-80B54CE2512A}" type="datetimeFigureOut">
               <a:rPr lang="ko-KR" altLang="en-US" smtClean="0"/>
-              <a:t>2019-07-02</a:t>
+              <a:t>2019-07-04</a:t>
             </a:fld>
             <a:endParaRPr lang="ko-KR" altLang="en-US"/>
           </a:p>
@@ -4465,7 +4550,7 @@
           <a:p>
             <a:fld id="{5B658BC9-C7E9-412A-B4B5-80B54CE2512A}" type="datetimeFigureOut">
               <a:rPr lang="ko-KR" altLang="en-US" smtClean="0"/>
-              <a:t>2019-07-02</a:t>
+              <a:t>2019-07-04</a:t>
             </a:fld>
             <a:endParaRPr lang="ko-KR" altLang="en-US"/>
           </a:p>
@@ -4706,7 +4791,7 @@
           <a:p>
             <a:fld id="{5B658BC9-C7E9-412A-B4B5-80B54CE2512A}" type="datetimeFigureOut">
               <a:rPr lang="ko-KR" altLang="en-US" smtClean="0"/>
-              <a:t>2019-07-02</a:t>
+              <a:t>2019-07-04</a:t>
             </a:fld>
             <a:endParaRPr lang="ko-KR" altLang="en-US"/>
           </a:p>
@@ -10485,6 +10570,329 @@
     <p:extLst>
       <p:ext uri="{BB962C8B-B14F-4D97-AF65-F5344CB8AC3E}">
         <p14:creationId xmlns:p14="http://schemas.microsoft.com/office/powerpoint/2010/main" val="662924888"/>
+      </p:ext>
+    </p:extLst>
+  </p:cSld>
+  <p:clrMapOvr>
+    <a:masterClrMapping/>
+  </p:clrMapOvr>
+</p:sld>
+</file>
+
+<file path=ppt/slides/slide19.xml><?xml version="1.0" encoding="utf-8"?>
+<p:sld xmlns:a="http://schemas.openxmlformats.org/drawingml/2006/main" xmlns:r="http://schemas.openxmlformats.org/officeDocument/2006/relationships" xmlns:p="http://schemas.openxmlformats.org/presentationml/2006/main">
+  <p:cSld>
+    <p:spTree>
+      <p:nvGrpSpPr>
+        <p:cNvPr id="1" name=""/>
+        <p:cNvGrpSpPr/>
+        <p:nvPr/>
+      </p:nvGrpSpPr>
+      <p:grpSpPr>
+        <a:xfrm>
+          <a:off x="0" y="0"/>
+          <a:ext cx="0" cy="0"/>
+          <a:chOff x="0" y="0"/>
+          <a:chExt cx="0" cy="0"/>
+        </a:xfrm>
+      </p:grpSpPr>
+      <p:sp>
+        <p:nvSpPr>
+          <p:cNvPr id="6" name="직사각형 5"/>
+          <p:cNvSpPr/>
+          <p:nvPr/>
+        </p:nvSpPr>
+        <p:spPr>
+          <a:xfrm>
+            <a:off x="162232" y="221226"/>
+            <a:ext cx="1106129" cy="1106129"/>
+          </a:xfrm>
+          <a:prstGeom prst="rect">
+            <a:avLst/>
+          </a:prstGeom>
+          <a:solidFill>
+            <a:srgbClr val="0C4C89"/>
+          </a:solidFill>
+          <a:ln>
+            <a:noFill/>
+          </a:ln>
+        </p:spPr>
+        <p:style>
+          <a:lnRef idx="2">
+            <a:schemeClr val="accent1">
+              <a:shade val="50000"/>
+            </a:schemeClr>
+          </a:lnRef>
+          <a:fillRef idx="1">
+            <a:schemeClr val="accent1"/>
+          </a:fillRef>
+          <a:effectRef idx="0">
+            <a:schemeClr val="accent1"/>
+          </a:effectRef>
+          <a:fontRef idx="minor">
+            <a:schemeClr val="lt1"/>
+          </a:fontRef>
+        </p:style>
+        <p:txBody>
+          <a:bodyPr rtlCol="0" anchor="ctr"/>
+          <a:lstStyle/>
+          <a:p>
+            <a:pPr algn="ctr"/>
+            <a:endParaRPr lang="ko-KR" altLang="en-US"/>
+          </a:p>
+        </p:txBody>
+      </p:sp>
+      <p:sp>
+        <p:nvSpPr>
+          <p:cNvPr id="8" name="TextBox 7"/>
+          <p:cNvSpPr txBox="1"/>
+          <p:nvPr/>
+        </p:nvSpPr>
+        <p:spPr>
+          <a:xfrm>
+            <a:off x="1327612" y="496358"/>
+            <a:ext cx="5073445" cy="584775"/>
+          </a:xfrm>
+          <a:prstGeom prst="rect">
+            <a:avLst/>
+          </a:prstGeom>
+          <a:noFill/>
+        </p:spPr>
+        <p:txBody>
+          <a:bodyPr wrap="square" rtlCol="0">
+            <a:spAutoFit/>
+          </a:bodyPr>
+          <a:lstStyle/>
+          <a:p>
+            <a:r>
+              <a:rPr lang="ko-KR" altLang="en-US" sz="1600" spc="-150" dirty="0">
+                <a:ln>
+                  <a:solidFill>
+                    <a:schemeClr val="accent1">
+                      <a:alpha val="0"/>
+                    </a:schemeClr>
+                  </a:solidFill>
+                </a:ln>
+                <a:solidFill>
+                  <a:schemeClr val="tx1">
+                    <a:lumMod val="50000"/>
+                    <a:lumOff val="50000"/>
+                  </a:schemeClr>
+                </a:solidFill>
+                <a:latin typeface="나눔고딕" panose="020D0604000000000000" pitchFamily="50" charset="-127"/>
+                <a:ea typeface="나눔고딕" panose="020D0604000000000000" pitchFamily="50" charset="-127"/>
+              </a:rPr>
+              <a:t>비트 </a:t>
+            </a:r>
+            <a:r>
+              <a:rPr lang="en-US" altLang="ko-KR" sz="1600" spc="-150" dirty="0">
+                <a:ln>
+                  <a:solidFill>
+                    <a:schemeClr val="accent1">
+                      <a:alpha val="0"/>
+                    </a:schemeClr>
+                  </a:solidFill>
+                </a:ln>
+                <a:solidFill>
+                  <a:schemeClr val="tx1">
+                    <a:lumMod val="50000"/>
+                    <a:lumOff val="50000"/>
+                  </a:schemeClr>
+                </a:solidFill>
+                <a:latin typeface="나눔고딕" panose="020D0604000000000000" pitchFamily="50" charset="-127"/>
+                <a:ea typeface="나눔고딕" panose="020D0604000000000000" pitchFamily="50" charset="-127"/>
+              </a:rPr>
+              <a:t>1</a:t>
+            </a:r>
+            <a:r>
+              <a:rPr lang="ko-KR" altLang="en-US" sz="1600" spc="-150" dirty="0">
+                <a:ln>
+                  <a:solidFill>
+                    <a:schemeClr val="accent1">
+                      <a:alpha val="0"/>
+                    </a:schemeClr>
+                  </a:solidFill>
+                </a:ln>
+                <a:solidFill>
+                  <a:schemeClr val="tx1">
+                    <a:lumMod val="50000"/>
+                    <a:lumOff val="50000"/>
+                  </a:schemeClr>
+                </a:solidFill>
+                <a:latin typeface="나눔고딕" panose="020D0604000000000000" pitchFamily="50" charset="-127"/>
+                <a:ea typeface="나눔고딕" panose="020D0604000000000000" pitchFamily="50" charset="-127"/>
+              </a:rPr>
+              <a:t>차 </a:t>
+            </a:r>
+            <a:endParaRPr lang="en-US" altLang="ko-KR" sz="1600" spc="-150" dirty="0">
+              <a:ln>
+                <a:solidFill>
+                  <a:schemeClr val="accent1">
+                    <a:alpha val="0"/>
+                  </a:schemeClr>
+                </a:solidFill>
+              </a:ln>
+              <a:solidFill>
+                <a:schemeClr val="tx1">
+                  <a:lumMod val="50000"/>
+                  <a:lumOff val="50000"/>
+                </a:schemeClr>
+              </a:solidFill>
+              <a:latin typeface="나눔고딕" panose="020D0604000000000000" pitchFamily="50" charset="-127"/>
+              <a:ea typeface="나눔고딕" panose="020D0604000000000000" pitchFamily="50" charset="-127"/>
+            </a:endParaRPr>
+          </a:p>
+          <a:p>
+            <a:r>
+              <a:rPr lang="ko-KR" altLang="en-US" sz="1600" spc="-150" dirty="0">
+                <a:ln>
+                  <a:solidFill>
+                    <a:schemeClr val="accent1">
+                      <a:alpha val="0"/>
+                    </a:schemeClr>
+                  </a:solidFill>
+                </a:ln>
+                <a:solidFill>
+                  <a:schemeClr val="tx1">
+                    <a:lumMod val="50000"/>
+                    <a:lumOff val="50000"/>
+                  </a:schemeClr>
+                </a:solidFill>
+                <a:latin typeface="나눔고딕" panose="020D0604000000000000" pitchFamily="50" charset="-127"/>
+                <a:ea typeface="나눔고딕" panose="020D0604000000000000" pitchFamily="50" charset="-127"/>
+              </a:rPr>
+              <a:t>과제</a:t>
+            </a:r>
+          </a:p>
+        </p:txBody>
+      </p:sp>
+      <p:sp>
+        <p:nvSpPr>
+          <p:cNvPr id="17" name="직사각형 16"/>
+          <p:cNvSpPr/>
+          <p:nvPr/>
+        </p:nvSpPr>
+        <p:spPr>
+          <a:xfrm>
+            <a:off x="0" y="6725263"/>
+            <a:ext cx="12192000" cy="147484"/>
+          </a:xfrm>
+          <a:prstGeom prst="rect">
+            <a:avLst/>
+          </a:prstGeom>
+          <a:solidFill>
+            <a:srgbClr val="0C4C89"/>
+          </a:solidFill>
+          <a:ln>
+            <a:noFill/>
+          </a:ln>
+        </p:spPr>
+        <p:style>
+          <a:lnRef idx="2">
+            <a:schemeClr val="accent1">
+              <a:shade val="50000"/>
+            </a:schemeClr>
+          </a:lnRef>
+          <a:fillRef idx="1">
+            <a:schemeClr val="accent1"/>
+          </a:fillRef>
+          <a:effectRef idx="0">
+            <a:schemeClr val="accent1"/>
+          </a:effectRef>
+          <a:fontRef idx="minor">
+            <a:schemeClr val="lt1"/>
+          </a:fontRef>
+        </p:style>
+        <p:txBody>
+          <a:bodyPr rtlCol="0" anchor="ctr"/>
+          <a:lstStyle/>
+          <a:p>
+            <a:pPr algn="ctr"/>
+            <a:endParaRPr lang="ko-KR" altLang="en-US" dirty="0"/>
+          </a:p>
+        </p:txBody>
+      </p:sp>
+      <p:pic>
+        <p:nvPicPr>
+          <p:cNvPr id="1026" name="Picture 2" descr="ì¹´í24 PNGì ëí ì´ë¯¸ì§ ê²ìê²°ê³¼">
+            <a:extLst>
+              <a:ext uri="{FF2B5EF4-FFF2-40B4-BE49-F238E27FC236}">
+                <a16:creationId xmlns:a16="http://schemas.microsoft.com/office/drawing/2014/main" id="{C2656E72-BE7E-4D2A-B262-7FA32FFBB45C}"/>
+              </a:ext>
+            </a:extLst>
+          </p:cNvPr>
+          <p:cNvPicPr>
+            <a:picLocks noChangeAspect="1" noChangeArrowheads="1"/>
+          </p:cNvPicPr>
+          <p:nvPr/>
+        </p:nvPicPr>
+        <p:blipFill>
+          <a:blip r:embed="rId3">
+            <a:extLst>
+              <a:ext uri="{28A0092B-C50C-407E-A947-70E740481C1C}">
+                <a14:useLocalDpi xmlns:a14="http://schemas.microsoft.com/office/drawing/2010/main" val="0"/>
+              </a:ext>
+            </a:extLst>
+          </a:blip>
+          <a:srcRect/>
+          <a:stretch>
+            <a:fillRect/>
+          </a:stretch>
+        </p:blipFill>
+        <p:spPr bwMode="auto">
+          <a:xfrm>
+            <a:off x="10886027" y="6323425"/>
+            <a:ext cx="1305973" cy="401838"/>
+          </a:xfrm>
+          <a:prstGeom prst="rect">
+            <a:avLst/>
+          </a:prstGeom>
+          <a:noFill/>
+          <a:extLst>
+            <a:ext uri="{909E8E84-426E-40DD-AFC4-6F175D3DCCD1}">
+              <a14:hiddenFill xmlns:a14="http://schemas.microsoft.com/office/drawing/2010/main">
+                <a:solidFill>
+                  <a:srgbClr val="FFFFFF"/>
+                </a:solidFill>
+              </a14:hiddenFill>
+            </a:ext>
+          </a:extLst>
+        </p:spPr>
+      </p:pic>
+      <p:pic>
+        <p:nvPicPr>
+          <p:cNvPr id="2" name="그림 1">
+            <a:extLst>
+              <a:ext uri="{FF2B5EF4-FFF2-40B4-BE49-F238E27FC236}">
+                <a16:creationId xmlns:a16="http://schemas.microsoft.com/office/drawing/2014/main" id="{530C4F53-5A00-45A9-A0AB-8D77AA271573}"/>
+              </a:ext>
+            </a:extLst>
+          </p:cNvPr>
+          <p:cNvPicPr>
+            <a:picLocks noChangeAspect="1"/>
+          </p:cNvPicPr>
+          <p:nvPr/>
+        </p:nvPicPr>
+        <p:blipFill>
+          <a:blip r:embed="rId4"/>
+          <a:stretch>
+            <a:fillRect/>
+          </a:stretch>
+        </p:blipFill>
+        <p:spPr>
+          <a:xfrm>
+            <a:off x="0" y="0"/>
+            <a:ext cx="12192000" cy="6052429"/>
+          </a:xfrm>
+          <a:prstGeom prst="rect">
+            <a:avLst/>
+          </a:prstGeom>
+        </p:spPr>
+      </p:pic>
+    </p:spTree>
+    <p:extLst>
+      <p:ext uri="{BB962C8B-B14F-4D97-AF65-F5344CB8AC3E}">
+        <p14:creationId xmlns:p14="http://schemas.microsoft.com/office/powerpoint/2010/main" val="2988444370"/>
       </p:ext>
     </p:extLst>
   </p:cSld>
@@ -13435,7 +13843,7 @@
         </p:spPr>
         <p:txBody>
           <a:bodyPr>
-            <a:normAutofit fontScale="92500" lnSpcReduction="20000"/>
+            <a:normAutofit fontScale="62500" lnSpcReduction="20000"/>
           </a:bodyPr>
           <a:lstStyle/>
           <a:p>
@@ -13486,6 +13894,9 @@
           </a:p>
           <a:p>
             <a:pPr marL="342900" indent="-342900">
+              <a:lnSpc>
+                <a:spcPct val="120000"/>
+              </a:lnSpc>
               <a:buAutoNum type="arabicParenR"/>
             </a:pPr>
             <a:r>
@@ -13499,6 +13910,9 @@
           </a:p>
           <a:p>
             <a:pPr marL="342900" indent="-342900">
+              <a:lnSpc>
+                <a:spcPct val="120000"/>
+              </a:lnSpc>
               <a:buAutoNum type="arabicParenR"/>
             </a:pPr>
             <a:r>
@@ -13536,6 +13950,9 @@
           </a:p>
           <a:p>
             <a:pPr marL="342900" indent="-342900">
+              <a:lnSpc>
+                <a:spcPct val="120000"/>
+              </a:lnSpc>
               <a:buAutoNum type="arabicParenR"/>
             </a:pPr>
             <a:r>
@@ -13613,6 +14030,9 @@
           </a:p>
           <a:p>
             <a:pPr marL="342900" indent="-342900">
+              <a:lnSpc>
+                <a:spcPct val="120000"/>
+              </a:lnSpc>
               <a:buAutoNum type="arabicParenR"/>
             </a:pPr>
             <a:r>
@@ -13769,6 +14189,62 @@
               <a:rPr lang="en-US" altLang="ko-KR" sz="1200" dirty="0"/>
               <a:t>)</a:t>
             </a:r>
+          </a:p>
+          <a:p>
+            <a:pPr marL="0" indent="0">
+              <a:buNone/>
+            </a:pPr>
+            <a:endParaRPr lang="en-US" altLang="ko-KR" sz="1200" dirty="0"/>
+          </a:p>
+          <a:p>
+            <a:pPr marL="0" indent="0">
+              <a:buNone/>
+            </a:pPr>
+            <a:r>
+              <a:rPr lang="en-US" altLang="ko-KR" sz="1800" dirty="0"/>
+              <a:t>※ </a:t>
+            </a:r>
+            <a:r>
+              <a:rPr lang="ko-KR" altLang="en-US" sz="1800" dirty="0"/>
+              <a:t>비밀번호정책</a:t>
+            </a:r>
+            <a:endParaRPr lang="en-US" altLang="ko-KR" sz="1800" dirty="0"/>
+          </a:p>
+          <a:p>
+            <a:pPr fontAlgn="base"/>
+            <a:r>
+              <a:rPr lang="ko-KR" altLang="en-US" sz="1800" dirty="0"/>
+              <a:t>암호화만을 목적으로 하는 해시 알고리즘 </a:t>
+            </a:r>
+            <a:r>
+              <a:rPr lang="en-US" altLang="ko-KR" sz="1800" dirty="0"/>
+              <a:t>SHA256</a:t>
+            </a:r>
+            <a:r>
+              <a:rPr lang="ko-KR" altLang="en-US" sz="1800" dirty="0"/>
+              <a:t>을 사용 </a:t>
+            </a:r>
+            <a:r>
+              <a:rPr lang="en-US" altLang="ko-KR" sz="1800" dirty="0"/>
+              <a:t>ex ) </a:t>
+            </a:r>
+            <a:r>
+              <a:rPr lang="en-US" altLang="ko-KR" dirty="0" err="1"/>
+              <a:t>aes_encrypt</a:t>
+            </a:r>
+            <a:r>
+              <a:rPr lang="en-US" altLang="ko-KR" dirty="0"/>
+              <a:t>('12345!',SHA2('key_value',256))</a:t>
+            </a:r>
+          </a:p>
+          <a:p>
+            <a:endParaRPr lang="en-US" altLang="ko-KR" sz="1800" dirty="0"/>
+          </a:p>
+          <a:p>
+            <a:pPr marL="0" indent="0">
+              <a:buNone/>
+            </a:pPr>
+            <a:endParaRPr lang="en-US" altLang="ko-KR" sz="1800" dirty="0"/>
           </a:p>
           <a:p>
             <a:pPr marL="0" indent="0">
@@ -15188,7 +15664,7 @@
         </p:spPr>
         <p:txBody>
           <a:bodyPr>
-            <a:normAutofit fontScale="92500" lnSpcReduction="20000"/>
+            <a:normAutofit fontScale="85000" lnSpcReduction="20000"/>
           </a:bodyPr>
           <a:lstStyle/>
           <a:p>
@@ -15251,15 +15727,7 @@
             </a:r>
             <a:r>
               <a:rPr lang="ko-KR" altLang="en-US" sz="1600" dirty="0"/>
-              <a:t>상세정보 또는 상품목록 페이지에 있는 </a:t>
-            </a:r>
-            <a:r>
-              <a:rPr lang="ko-KR" altLang="en-US" sz="1600" dirty="0" err="1"/>
-              <a:t>카트버튼을</a:t>
-            </a:r>
-            <a:r>
-              <a:rPr lang="ko-KR" altLang="en-US" sz="1600" dirty="0"/>
-              <a:t> 누른다</a:t>
+              <a:t>상세정보 또는 상품목록 페이지에 있는 카트 버튼을 누른다</a:t>
             </a:r>
             <a:r>
               <a:rPr lang="en-US" altLang="ko-KR" sz="1600" dirty="0"/>
@@ -15342,6 +15810,9 @@
           </a:p>
           <a:p>
             <a:pPr marL="342900" indent="-342900">
+              <a:lnSpc>
+                <a:spcPct val="120000"/>
+              </a:lnSpc>
               <a:buAutoNum type="alphaLcParenR"/>
             </a:pPr>
             <a:r>
@@ -15363,6 +15834,9 @@
           </a:p>
           <a:p>
             <a:pPr marL="342900" indent="-342900">
+              <a:lnSpc>
+                <a:spcPct val="120000"/>
+              </a:lnSpc>
               <a:buAutoNum type="alphaLcParenR"/>
             </a:pPr>
             <a:r>

</xml_diff>